<commit_message>
added unique validation for product, categories and pages. added visualise products in orders in customer side
</commit_message>
<xml_diff>
--- a/Presentation.pptx
+++ b/Presentation.pptx
@@ -3078,40 +3078,13 @@
               <a:t>CMS</a:t>
             </a:r>
             <a:r>
-              <a:rPr lang="ru-RU" sz="4400" b="1" dirty="0">
+              <a:rPr lang="uk-UA" sz="4400" b="1" dirty="0">
                 <a:solidFill>
                   <a:srgbClr val="49527C"/>
                 </a:solidFill>
                 <a:latin typeface="Calibri (Body)"/>
               </a:rPr>
-              <a:t>-</a:t>
-            </a:r>
-            <a:r>
-              <a:rPr lang="uk-UA" sz="4400" b="1" dirty="0">
-                <a:solidFill>
-                  <a:srgbClr val="49527C"/>
-                </a:solidFill>
-                <a:latin typeface="Calibri (Body)"/>
-              </a:rPr>
-              <a:t>система </a:t>
-            </a:r>
-            <a:r>
-              <a:rPr lang="ru-RU" sz="4400" b="1" dirty="0">
-                <a:solidFill>
-                  <a:srgbClr val="49527C"/>
-                </a:solidFill>
-                <a:latin typeface="Calibri (Body)"/>
-              </a:rPr>
-              <a:t>для </a:t>
-            </a:r>
-            <a:r>
-              <a:rPr lang="uk-UA" sz="4400" b="1" dirty="0">
-                <a:solidFill>
-                  <a:srgbClr val="49527C"/>
-                </a:solidFill>
-                <a:latin typeface="Calibri (Body)"/>
-              </a:rPr>
-              <a:t>інтернет-магазину спортивного харчування </a:t>
+              <a:t>-система для інтернет-магазину спортивного харчування </a:t>
             </a:r>
             <a:br>
               <a:rPr lang="ru-RU" sz="4400" b="1" dirty="0">
@@ -4287,15 +4260,15 @@
                   <a:srgbClr val="49527C"/>
                 </a:solidFill>
               </a:rPr>
-              <a:t>Створення </a:t>
-            </a:r>
-            <a:r>
-              <a:rPr lang="en-US" sz="2400" dirty="0">
-                <a:solidFill>
-                  <a:srgbClr val="49527C"/>
-                </a:solidFill>
-              </a:rPr>
-              <a:t>CMS</a:t>
+              <a:t>Створення інтернет-магазину спортивного харчування із інтуїтивно зрозумілим інтерфейсом для покупців та зручним керуванням контентом магазину з </a:t>
+            </a:r>
+            <a:r>
+              <a:rPr lang="uk-UA" sz="2400" dirty="0" err="1">
+                <a:solidFill>
+                  <a:srgbClr val="49527C"/>
+                </a:solidFill>
+              </a:rPr>
+              <a:t>адмін</a:t>
             </a:r>
             <a:r>
               <a:rPr lang="uk-UA" sz="2400" dirty="0">
@@ -4303,55 +4276,7 @@
                   <a:srgbClr val="49527C"/>
                 </a:solidFill>
               </a:rPr>
-              <a:t>-системи для інтернет-магазину спортивного харчування зі </a:t>
-            </a:r>
-            <a:r>
-              <a:rPr lang="uk-UA" sz="2400" dirty="0" err="1">
-                <a:solidFill>
-                  <a:srgbClr val="49527C"/>
-                </a:solidFill>
-              </a:rPr>
-              <a:t>інтуєтивно</a:t>
-            </a:r>
-            <a:r>
-              <a:rPr lang="uk-UA" sz="2400" dirty="0">
-                <a:solidFill>
-                  <a:srgbClr val="49527C"/>
-                </a:solidFill>
-              </a:rPr>
-              <a:t> зрозумілим </a:t>
-            </a:r>
-            <a:r>
-              <a:rPr lang="uk-UA" sz="2400" dirty="0" err="1">
-                <a:solidFill>
-                  <a:srgbClr val="49527C"/>
-                </a:solidFill>
-              </a:rPr>
-              <a:t>інтерфесом</a:t>
-            </a:r>
-            <a:r>
-              <a:rPr lang="uk-UA" sz="2400" dirty="0">
-                <a:solidFill>
-                  <a:srgbClr val="49527C"/>
-                </a:solidFill>
-              </a:rPr>
-              <a:t> для покупців та зручним керуванням контентом магазину з «</a:t>
-            </a:r>
-            <a:r>
-              <a:rPr lang="uk-UA" sz="2400" dirty="0" err="1">
-                <a:solidFill>
-                  <a:srgbClr val="49527C"/>
-                </a:solidFill>
-              </a:rPr>
-              <a:t>адмін</a:t>
-            </a:r>
-            <a:r>
-              <a:rPr lang="uk-UA" sz="2400" dirty="0">
-                <a:solidFill>
-                  <a:srgbClr val="49527C"/>
-                </a:solidFill>
-              </a:rPr>
-              <a:t> панелі»</a:t>
+              <a:t> панелі.</a:t>
             </a:r>
             <a:endParaRPr lang="en-US" sz="2400" dirty="0">
               <a:solidFill>

</xml_diff>